<commit_message>
updated powerpoint + project
updated powerpoint + project
</commit_message>
<xml_diff>
--- a/RGBLed/RGB Led met Raspberry Pi.pptx
+++ b/RGBLed/RGB Led met Raspberry Pi.pptx
@@ -5,10 +5,10 @@
     <p:sldMasterId id="2147483912" r:id="rId1"/>
   </p:sldMasterIdLst>
   <p:notesMasterIdLst>
-    <p:notesMasterId r:id="rId11"/>
+    <p:notesMasterId r:id="rId14"/>
   </p:notesMasterIdLst>
   <p:handoutMasterIdLst>
-    <p:handoutMasterId r:id="rId12"/>
+    <p:handoutMasterId r:id="rId15"/>
   </p:handoutMasterIdLst>
   <p:sldIdLst>
     <p:sldId id="256" r:id="rId2"/>
@@ -18,8 +18,11 @@
     <p:sldId id="260" r:id="rId6"/>
     <p:sldId id="261" r:id="rId7"/>
     <p:sldId id="262" r:id="rId8"/>
-    <p:sldId id="263" r:id="rId9"/>
-    <p:sldId id="264" r:id="rId10"/>
+    <p:sldId id="265" r:id="rId9"/>
+    <p:sldId id="266" r:id="rId10"/>
+    <p:sldId id="263" r:id="rId11"/>
+    <p:sldId id="264" r:id="rId12"/>
+    <p:sldId id="267" r:id="rId13"/>
   </p:sldIdLst>
   <p:sldSz cx="9144000" cy="6858000" type="screen4x3"/>
   <p:notesSz cx="6858000" cy="9144000"/>
@@ -203,7 +206,7 @@
           <a:p>
             <a:fld id="{E0EB8790-331E-5848-9E86-B245D743BB96}" type="datetimeFigureOut">
               <a:rPr lang="en-US" smtClean="0"/>
-              <a:t>5/5/2015</a:t>
+              <a:t>5/6/2015</a:t>
             </a:fld>
             <a:endParaRPr lang="en-US"/>
           </a:p>
@@ -369,7 +372,7 @@
           <a:p>
             <a:fld id="{51077F28-EBDF-DC4F-8E47-CBCCE1B1E0B2}" type="datetimeFigureOut">
               <a:rPr lang="en-US" smtClean="0"/>
-              <a:t>5/5/2015</a:t>
+              <a:t>5/6/2015</a:t>
             </a:fld>
             <a:endParaRPr lang="en-US"/>
           </a:p>
@@ -5598,6 +5601,378 @@
   <p:clrMapOvr>
     <a:masterClrMapping/>
   </p:clrMapOvr>
+  <p:timing>
+    <p:tnLst>
+      <p:par>
+        <p:cTn id="1" dur="indefinite" restart="never" nodeType="tmRoot"/>
+      </p:par>
+    </p:tnLst>
+  </p:timing>
+</p:sld>
+</file>
+
+<file path=ppt/slides/slide10.xml><?xml version="1.0" encoding="utf-8"?>
+<p:sld xmlns:a="http://schemas.openxmlformats.org/drawingml/2006/main" xmlns:r="http://schemas.openxmlformats.org/officeDocument/2006/relationships" xmlns:p="http://schemas.openxmlformats.org/presentationml/2006/main">
+  <p:cSld>
+    <p:spTree>
+      <p:nvGrpSpPr>
+        <p:cNvPr id="1" name=""/>
+        <p:cNvGrpSpPr/>
+        <p:nvPr/>
+      </p:nvGrpSpPr>
+      <p:grpSpPr>
+        <a:xfrm>
+          <a:off x="0" y="0"/>
+          <a:ext cx="0" cy="0"/>
+          <a:chOff x="0" y="0"/>
+          <a:chExt cx="0" cy="0"/>
+        </a:xfrm>
+      </p:grpSpPr>
+      <p:sp>
+        <p:nvSpPr>
+          <p:cNvPr id="2" name="Titel 1"/>
+          <p:cNvSpPr>
+            <a:spLocks noGrp="1"/>
+          </p:cNvSpPr>
+          <p:nvPr>
+            <p:ph type="title"/>
+          </p:nvPr>
+        </p:nvSpPr>
+        <p:spPr/>
+        <p:txBody>
+          <a:bodyPr/>
+          <a:lstStyle/>
+          <a:p>
+            <a:r>
+              <a:rPr lang="nl-BE" dirty="0" smtClean="0"/>
+              <a:t>Samenvatting</a:t>
+            </a:r>
+            <a:endParaRPr lang="nl-BE" dirty="0"/>
+          </a:p>
+        </p:txBody>
+      </p:sp>
+      <p:sp>
+        <p:nvSpPr>
+          <p:cNvPr id="3" name="Tijdelijke aanduiding voor dianummer 2"/>
+          <p:cNvSpPr>
+            <a:spLocks noGrp="1"/>
+          </p:cNvSpPr>
+          <p:nvPr>
+            <p:ph type="sldNum" sz="quarter" idx="4"/>
+          </p:nvPr>
+        </p:nvSpPr>
+        <p:spPr/>
+        <p:txBody>
+          <a:bodyPr/>
+          <a:lstStyle/>
+          <a:p>
+            <a:fld id="{80DBCD4E-D6F6-174C-8E8A-F21DB8B4B62B}" type="slidenum">
+              <a:rPr lang="en-US" smtClean="0"/>
+              <a:pPr/>
+              <a:t>10</a:t>
+            </a:fld>
+            <a:endParaRPr lang="en-US" dirty="0"/>
+          </a:p>
+        </p:txBody>
+      </p:sp>
+      <p:sp>
+        <p:nvSpPr>
+          <p:cNvPr id="4" name="Tekstvak 3"/>
+          <p:cNvSpPr txBox="1"/>
+          <p:nvPr/>
+        </p:nvSpPr>
+        <p:spPr>
+          <a:xfrm>
+            <a:off x="576648" y="1589903"/>
+            <a:ext cx="3847207" cy="1200329"/>
+          </a:xfrm>
+          <a:prstGeom prst="rect">
+            <a:avLst/>
+          </a:prstGeom>
+          <a:noFill/>
+        </p:spPr>
+        <p:txBody>
+          <a:bodyPr wrap="none" rtlCol="0">
+            <a:spAutoFit/>
+          </a:bodyPr>
+          <a:lstStyle/>
+          <a:p>
+            <a:r>
+              <a:rPr lang="nl-BE" dirty="0" smtClean="0">
+                <a:latin typeface="Ubuntu" panose="020B0504030602030204" pitchFamily="34" charset="0"/>
+              </a:rPr>
+              <a:t>Mogelijk maar, …</a:t>
+            </a:r>
+          </a:p>
+          <a:p>
+            <a:pPr marL="285750" indent="-285750">
+              <a:buFont typeface="Arial" panose="020B0604020202020204" pitchFamily="34" charset="0"/>
+              <a:buChar char="•"/>
+            </a:pPr>
+            <a:r>
+              <a:rPr lang="nl-BE" dirty="0" smtClean="0">
+                <a:latin typeface="Ubuntu" panose="020B0504030602030204" pitchFamily="34" charset="0"/>
+              </a:rPr>
+              <a:t>Geen eenvoudige communicatie</a:t>
+            </a:r>
+          </a:p>
+          <a:p>
+            <a:pPr marL="285750" indent="-285750">
+              <a:buFont typeface="Arial" panose="020B0604020202020204" pitchFamily="34" charset="0"/>
+              <a:buChar char="•"/>
+            </a:pPr>
+            <a:r>
+              <a:rPr lang="nl-BE" dirty="0" smtClean="0">
+                <a:latin typeface="Ubuntu" panose="020B0504030602030204" pitchFamily="34" charset="0"/>
+              </a:rPr>
+              <a:t>Weinig info over </a:t>
+            </a:r>
+            <a:r>
+              <a:rPr lang="nl-BE" dirty="0" err="1" smtClean="0">
+                <a:latin typeface="Ubuntu" panose="020B0504030602030204" pitchFamily="34" charset="0"/>
+              </a:rPr>
+              <a:t>ledstrip</a:t>
+            </a:r>
+            <a:endParaRPr lang="nl-BE" dirty="0" smtClean="0">
+              <a:latin typeface="Ubuntu" panose="020B0504030602030204" pitchFamily="34" charset="0"/>
+            </a:endParaRPr>
+          </a:p>
+          <a:p>
+            <a:pPr marL="285750" indent="-285750">
+              <a:buFont typeface="Arial" panose="020B0604020202020204" pitchFamily="34" charset="0"/>
+              <a:buChar char="•"/>
+            </a:pPr>
+            <a:r>
+              <a:rPr lang="nl-BE" dirty="0">
+                <a:latin typeface="Ubuntu" panose="020B0504030602030204" pitchFamily="34" charset="0"/>
+              </a:rPr>
+              <a:t>P</a:t>
+            </a:r>
+            <a:r>
+              <a:rPr lang="nl-BE" dirty="0" smtClean="0">
+                <a:latin typeface="Ubuntu" panose="020B0504030602030204" pitchFamily="34" charset="0"/>
+              </a:rPr>
+              <a:t>ython</a:t>
+            </a:r>
+            <a:endParaRPr lang="nl-BE" dirty="0">
+              <a:latin typeface="Ubuntu" panose="020B0504030602030204" pitchFamily="34" charset="0"/>
+            </a:endParaRPr>
+          </a:p>
+        </p:txBody>
+      </p:sp>
+    </p:spTree>
+    <p:extLst>
+      <p:ext uri="{BB962C8B-B14F-4D97-AF65-F5344CB8AC3E}">
+        <p14:creationId xmlns:p14="http://schemas.microsoft.com/office/powerpoint/2010/main" val="2767405011"/>
+      </p:ext>
+    </p:extLst>
+  </p:cSld>
+  <p:clrMapOvr>
+    <a:masterClrMapping/>
+  </p:clrMapOvr>
+  <p:timing>
+    <p:tnLst>
+      <p:par>
+        <p:cTn id="1" dur="indefinite" restart="never" nodeType="tmRoot"/>
+      </p:par>
+    </p:tnLst>
+  </p:timing>
+</p:sld>
+</file>
+
+<file path=ppt/slides/slide11.xml><?xml version="1.0" encoding="utf-8"?>
+<p:sld xmlns:a="http://schemas.openxmlformats.org/drawingml/2006/main" xmlns:r="http://schemas.openxmlformats.org/officeDocument/2006/relationships" xmlns:p="http://schemas.openxmlformats.org/presentationml/2006/main">
+  <p:cSld>
+    <p:spTree>
+      <p:nvGrpSpPr>
+        <p:cNvPr id="1" name=""/>
+        <p:cNvGrpSpPr/>
+        <p:nvPr/>
+      </p:nvGrpSpPr>
+      <p:grpSpPr>
+        <a:xfrm>
+          <a:off x="0" y="0"/>
+          <a:ext cx="0" cy="0"/>
+          <a:chOff x="0" y="0"/>
+          <a:chExt cx="0" cy="0"/>
+        </a:xfrm>
+      </p:grpSpPr>
+      <p:sp>
+        <p:nvSpPr>
+          <p:cNvPr id="2" name="Titel 1"/>
+          <p:cNvSpPr>
+            <a:spLocks noGrp="1"/>
+          </p:cNvSpPr>
+          <p:nvPr>
+            <p:ph type="title"/>
+          </p:nvPr>
+        </p:nvSpPr>
+        <p:spPr/>
+        <p:txBody>
+          <a:bodyPr/>
+          <a:lstStyle/>
+          <a:p>
+            <a:r>
+              <a:rPr lang="nl-BE" dirty="0" smtClean="0"/>
+              <a:t>Demo</a:t>
+            </a:r>
+            <a:endParaRPr lang="nl-BE" dirty="0"/>
+          </a:p>
+        </p:txBody>
+      </p:sp>
+      <p:sp>
+        <p:nvSpPr>
+          <p:cNvPr id="3" name="Tijdelijke aanduiding voor dianummer 2"/>
+          <p:cNvSpPr>
+            <a:spLocks noGrp="1"/>
+          </p:cNvSpPr>
+          <p:nvPr>
+            <p:ph type="sldNum" sz="quarter" idx="4"/>
+          </p:nvPr>
+        </p:nvSpPr>
+        <p:spPr/>
+        <p:txBody>
+          <a:bodyPr/>
+          <a:lstStyle/>
+          <a:p>
+            <a:fld id="{80DBCD4E-D6F6-174C-8E8A-F21DB8B4B62B}" type="slidenum">
+              <a:rPr lang="en-US" smtClean="0"/>
+              <a:pPr/>
+              <a:t>11</a:t>
+            </a:fld>
+            <a:endParaRPr lang="en-US" dirty="0"/>
+          </a:p>
+        </p:txBody>
+      </p:sp>
+    </p:spTree>
+    <p:extLst>
+      <p:ext uri="{BB962C8B-B14F-4D97-AF65-F5344CB8AC3E}">
+        <p14:creationId xmlns:p14="http://schemas.microsoft.com/office/powerpoint/2010/main" val="206950789"/>
+      </p:ext>
+    </p:extLst>
+  </p:cSld>
+  <p:clrMapOvr>
+    <a:masterClrMapping/>
+  </p:clrMapOvr>
+  <p:timing>
+    <p:tnLst>
+      <p:par>
+        <p:cTn id="1" dur="indefinite" restart="never" nodeType="tmRoot"/>
+      </p:par>
+    </p:tnLst>
+  </p:timing>
+</p:sld>
+</file>
+
+<file path=ppt/slides/slide12.xml><?xml version="1.0" encoding="utf-8"?>
+<p:sld xmlns:a="http://schemas.openxmlformats.org/drawingml/2006/main" xmlns:r="http://schemas.openxmlformats.org/officeDocument/2006/relationships" xmlns:p="http://schemas.openxmlformats.org/presentationml/2006/main">
+  <p:cSld>
+    <p:spTree>
+      <p:nvGrpSpPr>
+        <p:cNvPr id="1" name=""/>
+        <p:cNvGrpSpPr/>
+        <p:nvPr/>
+      </p:nvGrpSpPr>
+      <p:grpSpPr>
+        <a:xfrm>
+          <a:off x="0" y="0"/>
+          <a:ext cx="0" cy="0"/>
+          <a:chOff x="0" y="0"/>
+          <a:chExt cx="0" cy="0"/>
+        </a:xfrm>
+      </p:grpSpPr>
+      <p:sp>
+        <p:nvSpPr>
+          <p:cNvPr id="2" name="Titel 1"/>
+          <p:cNvSpPr>
+            <a:spLocks noGrp="1"/>
+          </p:cNvSpPr>
+          <p:nvPr>
+            <p:ph type="title"/>
+          </p:nvPr>
+        </p:nvSpPr>
+        <p:spPr/>
+        <p:txBody>
+          <a:bodyPr/>
+          <a:lstStyle/>
+          <a:p>
+            <a:endParaRPr lang="nl-BE"/>
+          </a:p>
+        </p:txBody>
+      </p:sp>
+      <p:sp>
+        <p:nvSpPr>
+          <p:cNvPr id="3" name="Tijdelijke aanduiding voor dianummer 2"/>
+          <p:cNvSpPr>
+            <a:spLocks noGrp="1"/>
+          </p:cNvSpPr>
+          <p:nvPr>
+            <p:ph type="sldNum" sz="quarter" idx="4"/>
+          </p:nvPr>
+        </p:nvSpPr>
+        <p:spPr/>
+        <p:txBody>
+          <a:bodyPr/>
+          <a:lstStyle/>
+          <a:p>
+            <a:fld id="{80DBCD4E-D6F6-174C-8E8A-F21DB8B4B62B}" type="slidenum">
+              <a:rPr lang="en-US" smtClean="0"/>
+              <a:pPr/>
+              <a:t>12</a:t>
+            </a:fld>
+            <a:endParaRPr lang="en-US" dirty="0"/>
+          </a:p>
+        </p:txBody>
+      </p:sp>
+      <p:pic>
+        <p:nvPicPr>
+          <p:cNvPr id="1029" name="Picture 5" descr="C:\Users\alisio\Desktop\KeepCalmStudio.com-[Crown]-Keep-Calm-And-Ask-Questions.png"/>
+          <p:cNvPicPr>
+            <a:picLocks noChangeAspect="1" noChangeArrowheads="1"/>
+          </p:cNvPicPr>
+          <p:nvPr/>
+        </p:nvPicPr>
+        <p:blipFill rotWithShape="1">
+          <a:blip r:embed="rId2">
+            <a:extLst>
+              <a:ext uri="{28A0092B-C50C-407E-A947-70E740481C1C}">
+                <a14:useLocalDpi xmlns:a14="http://schemas.microsoft.com/office/drawing/2010/main" val="0"/>
+              </a:ext>
+            </a:extLst>
+          </a:blip>
+          <a:srcRect b="7298"/>
+          <a:stretch/>
+        </p:blipFill>
+        <p:spPr bwMode="auto">
+          <a:xfrm>
+            <a:off x="1260390" y="152718"/>
+            <a:ext cx="6508925" cy="6033898"/>
+          </a:xfrm>
+          <a:prstGeom prst="rect">
+            <a:avLst/>
+          </a:prstGeom>
+          <a:noFill/>
+          <a:extLst>
+            <a:ext uri="{909E8E84-426E-40DD-AFC4-6F175D3DCCD1}">
+              <a14:hiddenFill xmlns:a14="http://schemas.microsoft.com/office/drawing/2010/main">
+                <a:solidFill>
+                  <a:srgbClr val="FFFFFF"/>
+                </a:solidFill>
+              </a14:hiddenFill>
+            </a:ext>
+          </a:extLst>
+        </p:spPr>
+      </p:pic>
+    </p:spTree>
+    <p:extLst>
+      <p:ext uri="{BB962C8B-B14F-4D97-AF65-F5344CB8AC3E}">
+        <p14:creationId xmlns:p14="http://schemas.microsoft.com/office/powerpoint/2010/main" val="3807130017"/>
+      </p:ext>
+    </p:extLst>
+  </p:cSld>
+  <p:clrMapOvr>
+    <a:masterClrMapping/>
+  </p:clrMapOvr>
 </p:sld>
 </file>
 
@@ -5651,6 +6026,13 @@
   <p:clrMapOvr>
     <a:masterClrMapping/>
   </p:clrMapOvr>
+  <p:timing>
+    <p:tnLst>
+      <p:par>
+        <p:cTn id="1" dur="indefinite" restart="never" nodeType="tmRoot"/>
+      </p:par>
+    </p:tnLst>
+  </p:timing>
 </p:sld>
 </file>
 
@@ -5830,8 +6212,11 @@
               <a:rPr lang="nl-BE" dirty="0" smtClean="0">
                 <a:latin typeface="Ubuntu" panose="020B0504030602030204" pitchFamily="34" charset="0"/>
               </a:rPr>
-              <a:t>C/PHP</a:t>
-            </a:r>
+              <a:t>C/PHP/Javascript</a:t>
+            </a:r>
+            <a:endParaRPr lang="nl-BE" dirty="0" smtClean="0">
+              <a:latin typeface="Ubuntu" panose="020B0504030602030204" pitchFamily="34" charset="0"/>
+            </a:endParaRPr>
           </a:p>
           <a:p>
             <a:pPr marL="285750" indent="-285750">
@@ -5872,6 +6257,13 @@
   <p:clrMapOvr>
     <a:masterClrMapping/>
   </p:clrMapOvr>
+  <p:timing>
+    <p:tnLst>
+      <p:par>
+        <p:cTn id="1" dur="indefinite" restart="never" nodeType="tmRoot"/>
+      </p:par>
+    </p:tnLst>
+  </p:timing>
 </p:sld>
 </file>
 
@@ -6275,6 +6667,13 @@
   <p:clrMapOvr>
     <a:masterClrMapping/>
   </p:clrMapOvr>
+  <p:timing>
+    <p:tnLst>
+      <p:par>
+        <p:cTn id="1" dur="indefinite" restart="never" nodeType="tmRoot"/>
+      </p:par>
+    </p:tnLst>
+  </p:timing>
 </p:sld>
 </file>
 
@@ -6346,6 +6745,169 @@
           </a:p>
         </p:txBody>
       </p:sp>
+      <p:sp>
+        <p:nvSpPr>
+          <p:cNvPr id="5" name="Tekstvak 4"/>
+          <p:cNvSpPr txBox="1"/>
+          <p:nvPr/>
+        </p:nvSpPr>
+        <p:spPr>
+          <a:xfrm>
+            <a:off x="518984" y="1524318"/>
+            <a:ext cx="5099221" cy="646331"/>
+          </a:xfrm>
+          <a:prstGeom prst="rect">
+            <a:avLst/>
+          </a:prstGeom>
+          <a:noFill/>
+        </p:spPr>
+        <p:txBody>
+          <a:bodyPr wrap="square" rtlCol="0">
+            <a:spAutoFit/>
+          </a:bodyPr>
+          <a:lstStyle/>
+          <a:p>
+            <a:pPr marL="285750" indent="-285750">
+              <a:buFont typeface="Arial" panose="020B0604020202020204" pitchFamily="34" charset="0"/>
+              <a:buChar char="•"/>
+            </a:pPr>
+            <a:r>
+              <a:rPr lang="nl-BE" dirty="0" smtClean="0">
+                <a:latin typeface="Ubuntu" panose="020B0504030602030204" pitchFamily="34" charset="0"/>
+              </a:rPr>
+              <a:t>9 </a:t>
+            </a:r>
+            <a:r>
+              <a:rPr lang="nl-BE" dirty="0" err="1" smtClean="0">
+                <a:latin typeface="Ubuntu" panose="020B0504030602030204" pitchFamily="34" charset="0"/>
+              </a:rPr>
+              <a:t>leds</a:t>
+            </a:r>
+            <a:endParaRPr lang="nl-BE" dirty="0" smtClean="0">
+              <a:latin typeface="Ubuntu" panose="020B0504030602030204" pitchFamily="34" charset="0"/>
+            </a:endParaRPr>
+          </a:p>
+          <a:p>
+            <a:pPr marL="285750" indent="-285750">
+              <a:buFont typeface="Arial" panose="020B0604020202020204" pitchFamily="34" charset="0"/>
+              <a:buChar char="•"/>
+            </a:pPr>
+            <a:r>
+              <a:rPr lang="nl-BE" dirty="0" smtClean="0">
+                <a:latin typeface="Ubuntu" panose="020B0504030602030204" pitchFamily="34" charset="0"/>
+              </a:rPr>
+              <a:t>24 bits</a:t>
+            </a:r>
+            <a:endParaRPr lang="nl-BE" dirty="0">
+              <a:latin typeface="Ubuntu" panose="020B0504030602030204" pitchFamily="34" charset="0"/>
+            </a:endParaRPr>
+          </a:p>
+        </p:txBody>
+      </p:sp>
+      <p:sp>
+        <p:nvSpPr>
+          <p:cNvPr id="7" name="Tekstvak 6"/>
+          <p:cNvSpPr txBox="1"/>
+          <p:nvPr/>
+        </p:nvSpPr>
+        <p:spPr>
+          <a:xfrm>
+            <a:off x="518984" y="2345893"/>
+            <a:ext cx="2611394" cy="646331"/>
+          </a:xfrm>
+          <a:prstGeom prst="rect">
+            <a:avLst/>
+          </a:prstGeom>
+          <a:noFill/>
+        </p:spPr>
+        <p:txBody>
+          <a:bodyPr wrap="square" rtlCol="0">
+            <a:spAutoFit/>
+          </a:bodyPr>
+          <a:lstStyle/>
+          <a:p>
+            <a:r>
+              <a:rPr lang="nl-BE" b="1" dirty="0" smtClean="0">
+                <a:latin typeface="Ubuntu" panose="020B0504030602030204" pitchFamily="34" charset="0"/>
+              </a:rPr>
+              <a:t>Voordelen</a:t>
+            </a:r>
+          </a:p>
+          <a:p>
+            <a:pPr marL="285750" indent="-285750">
+              <a:buFont typeface="Arial" panose="020B0604020202020204" pitchFamily="34" charset="0"/>
+              <a:buChar char="•"/>
+            </a:pPr>
+            <a:r>
+              <a:rPr lang="nl-BE" dirty="0" smtClean="0">
+                <a:latin typeface="Ubuntu" panose="020B0504030602030204" pitchFamily="34" charset="0"/>
+              </a:rPr>
+              <a:t>24 bits voor RGB</a:t>
+            </a:r>
+            <a:endParaRPr lang="nl-BE" dirty="0">
+              <a:latin typeface="Ubuntu" panose="020B0504030602030204" pitchFamily="34" charset="0"/>
+            </a:endParaRPr>
+          </a:p>
+        </p:txBody>
+      </p:sp>
+      <p:sp>
+        <p:nvSpPr>
+          <p:cNvPr id="8" name="Tekstvak 7"/>
+          <p:cNvSpPr txBox="1"/>
+          <p:nvPr/>
+        </p:nvSpPr>
+        <p:spPr>
+          <a:xfrm>
+            <a:off x="3838833" y="2368716"/>
+            <a:ext cx="4497860" cy="923330"/>
+          </a:xfrm>
+          <a:prstGeom prst="rect">
+            <a:avLst/>
+          </a:prstGeom>
+          <a:noFill/>
+        </p:spPr>
+        <p:txBody>
+          <a:bodyPr wrap="square" rtlCol="0">
+            <a:spAutoFit/>
+          </a:bodyPr>
+          <a:lstStyle/>
+          <a:p>
+            <a:r>
+              <a:rPr lang="nl-BE" b="1" dirty="0" smtClean="0">
+                <a:latin typeface="Ubuntu" panose="020B0504030602030204" pitchFamily="34" charset="0"/>
+              </a:rPr>
+              <a:t>Nadelen</a:t>
+            </a:r>
+          </a:p>
+          <a:p>
+            <a:pPr marL="285750" indent="-285750">
+              <a:buFont typeface="Arial" panose="020B0604020202020204" pitchFamily="34" charset="0"/>
+              <a:buChar char="•"/>
+            </a:pPr>
+            <a:r>
+              <a:rPr lang="nl-BE" dirty="0" smtClean="0">
+                <a:latin typeface="Ubuntu" panose="020B0504030602030204" pitchFamily="34" charset="0"/>
+              </a:rPr>
+              <a:t>Individueel niet aanspreekbaar</a:t>
+            </a:r>
+          </a:p>
+          <a:p>
+            <a:pPr marL="285750" indent="-285750">
+              <a:buFont typeface="Arial" panose="020B0604020202020204" pitchFamily="34" charset="0"/>
+              <a:buChar char="•"/>
+            </a:pPr>
+            <a:r>
+              <a:rPr lang="nl-BE" dirty="0" smtClean="0">
+                <a:latin typeface="Ubuntu" panose="020B0504030602030204" pitchFamily="34" charset="0"/>
+              </a:rPr>
+              <a:t>Foute interpretatie mogelijk</a:t>
+            </a:r>
+            <a:endParaRPr lang="nl-BE" dirty="0">
+              <a:latin typeface="Ubuntu" panose="020B0504030602030204" pitchFamily="34" charset="0"/>
+            </a:endParaRPr>
+          </a:p>
+        </p:txBody>
+      </p:sp>
     </p:spTree>
     <p:extLst>
       <p:ext uri="{BB962C8B-B14F-4D97-AF65-F5344CB8AC3E}">
@@ -6356,6 +6918,13 @@
   <p:clrMapOvr>
     <a:masterClrMapping/>
   </p:clrMapOvr>
+  <p:timing>
+    <p:tnLst>
+      <p:par>
+        <p:cTn id="1" dur="indefinite" restart="never" nodeType="tmRoot"/>
+      </p:par>
+    </p:tnLst>
+  </p:timing>
 </p:sld>
 </file>
 
@@ -6392,8 +6961,8 @@
           <a:lstStyle/>
           <a:p>
             <a:r>
-              <a:rPr lang="nl-BE" dirty="0" err="1" smtClean="0"/>
-              <a:t>Sowftware</a:t>
+              <a:rPr lang="nl-BE" dirty="0" smtClean="0"/>
+              <a:t>Software</a:t>
             </a:r>
             <a:endParaRPr lang="nl-BE" dirty="0"/>
           </a:p>
@@ -6420,6 +6989,206 @@
               <a:t>6</a:t>
             </a:fld>
             <a:endParaRPr lang="en-US" dirty="0"/>
+          </a:p>
+        </p:txBody>
+      </p:sp>
+      <p:sp>
+        <p:nvSpPr>
+          <p:cNvPr id="4" name="Tekstvak 3"/>
+          <p:cNvSpPr txBox="1"/>
+          <p:nvPr/>
+        </p:nvSpPr>
+        <p:spPr>
+          <a:xfrm>
+            <a:off x="551935" y="1598141"/>
+            <a:ext cx="5601730" cy="4247317"/>
+          </a:xfrm>
+          <a:prstGeom prst="rect">
+            <a:avLst/>
+          </a:prstGeom>
+          <a:noFill/>
+        </p:spPr>
+        <p:txBody>
+          <a:bodyPr wrap="square" rtlCol="0">
+            <a:spAutoFit/>
+          </a:bodyPr>
+          <a:lstStyle/>
+          <a:p>
+            <a:r>
+              <a:rPr lang="nl-BE" b="1" dirty="0">
+                <a:latin typeface="Ubuntu" panose="020B0504030602030204" pitchFamily="34" charset="0"/>
+              </a:rPr>
+              <a:t>C</a:t>
+            </a:r>
+            <a:endParaRPr lang="nl-BE" b="1" dirty="0" smtClean="0">
+              <a:latin typeface="Ubuntu" panose="020B0504030602030204" pitchFamily="34" charset="0"/>
+            </a:endParaRPr>
+          </a:p>
+          <a:p>
+            <a:r>
+              <a:rPr lang="nl-BE" i="1" dirty="0" smtClean="0">
+                <a:latin typeface="Ubuntu" panose="020B0504030602030204" pitchFamily="34" charset="0"/>
+              </a:rPr>
+              <a:t>Communicatie tussen C en </a:t>
+            </a:r>
+            <a:r>
+              <a:rPr lang="nl-BE" i="1" dirty="0" err="1" smtClean="0">
+                <a:latin typeface="Ubuntu" panose="020B0504030602030204" pitchFamily="34" charset="0"/>
+              </a:rPr>
+              <a:t>Raspberry</a:t>
+            </a:r>
+            <a:r>
+              <a:rPr lang="nl-BE" i="1" dirty="0" smtClean="0">
+                <a:latin typeface="Ubuntu" panose="020B0504030602030204" pitchFamily="34" charset="0"/>
+              </a:rPr>
+              <a:t> Pi</a:t>
+            </a:r>
+          </a:p>
+          <a:p>
+            <a:pPr marL="285750" indent="-285750">
+              <a:buFont typeface="Arial" panose="020B0604020202020204" pitchFamily="34" charset="0"/>
+              <a:buChar char="•"/>
+            </a:pPr>
+            <a:r>
+              <a:rPr lang="nl-BE" dirty="0" smtClean="0">
+                <a:latin typeface="Ubuntu" panose="020B0504030602030204" pitchFamily="34" charset="0"/>
+              </a:rPr>
+              <a:t>Juiste </a:t>
+            </a:r>
+            <a:r>
+              <a:rPr lang="nl-BE" dirty="0" err="1" smtClean="0">
+                <a:latin typeface="Ubuntu" panose="020B0504030602030204" pitchFamily="34" charset="0"/>
+              </a:rPr>
+              <a:t>toolset</a:t>
+            </a:r>
+            <a:endParaRPr lang="nl-BE" dirty="0" smtClean="0">
+              <a:latin typeface="Ubuntu" panose="020B0504030602030204" pitchFamily="34" charset="0"/>
+            </a:endParaRPr>
+          </a:p>
+          <a:p>
+            <a:pPr marL="285750" indent="-285750">
+              <a:buFont typeface="Arial" panose="020B0604020202020204" pitchFamily="34" charset="0"/>
+              <a:buChar char="•"/>
+            </a:pPr>
+            <a:r>
+              <a:rPr lang="nl-BE" dirty="0" smtClean="0">
+                <a:latin typeface="Ubuntu" panose="020B0504030602030204" pitchFamily="34" charset="0"/>
+              </a:rPr>
+              <a:t>Native voor Linux</a:t>
+            </a:r>
+          </a:p>
+          <a:p>
+            <a:pPr marL="285750" indent="-285750">
+              <a:buFont typeface="Arial" panose="020B0604020202020204" pitchFamily="34" charset="0"/>
+              <a:buChar char="•"/>
+            </a:pPr>
+            <a:endParaRPr lang="nl-BE" dirty="0" smtClean="0">
+              <a:latin typeface="Ubuntu" panose="020B0504030602030204" pitchFamily="34" charset="0"/>
+            </a:endParaRPr>
+          </a:p>
+          <a:p>
+            <a:r>
+              <a:rPr lang="nl-BE" b="1" dirty="0">
+                <a:latin typeface="Ubuntu" panose="020B0504030602030204" pitchFamily="34" charset="0"/>
+              </a:rPr>
+              <a:t>HTML/PHP/Javascript</a:t>
+            </a:r>
+          </a:p>
+          <a:p>
+            <a:r>
+              <a:rPr lang="nl-BE" i="1" dirty="0">
+                <a:latin typeface="Ubuntu" panose="020B0504030602030204" pitchFamily="34" charset="0"/>
+              </a:rPr>
+              <a:t>Lay-out + communicatie tussen PHP en C</a:t>
+            </a:r>
+          </a:p>
+          <a:p>
+            <a:pPr marL="285750" indent="-285750">
+              <a:buFont typeface="Arial" panose="020B0604020202020204" pitchFamily="34" charset="0"/>
+              <a:buChar char="•"/>
+            </a:pPr>
+            <a:r>
+              <a:rPr lang="nl-BE" dirty="0">
+                <a:latin typeface="Ubuntu" panose="020B0504030602030204" pitchFamily="34" charset="0"/>
+              </a:rPr>
+              <a:t>PHP heeft de functie </a:t>
+            </a:r>
+            <a:r>
+              <a:rPr lang="nl-BE" dirty="0" err="1" smtClean="0">
+                <a:latin typeface="Ubuntu" panose="020B0504030602030204" pitchFamily="34" charset="0"/>
+              </a:rPr>
+              <a:t>shell_exec</a:t>
+            </a:r>
+            <a:endParaRPr lang="nl-BE" dirty="0" smtClean="0">
+              <a:latin typeface="Ubuntu" panose="020B0504030602030204" pitchFamily="34" charset="0"/>
+            </a:endParaRPr>
+          </a:p>
+          <a:p>
+            <a:pPr marL="285750" indent="-285750">
+              <a:buFont typeface="Arial" panose="020B0604020202020204" pitchFamily="34" charset="0"/>
+              <a:buChar char="•"/>
+            </a:pPr>
+            <a:endParaRPr lang="nl-BE" dirty="0">
+              <a:latin typeface="Ubuntu" panose="020B0504030602030204" pitchFamily="34" charset="0"/>
+            </a:endParaRPr>
+          </a:p>
+          <a:p>
+            <a:r>
+              <a:rPr lang="nl-BE" b="1" dirty="0" err="1" smtClean="0">
+                <a:latin typeface="Ubuntu" panose="020B0504030602030204" pitchFamily="34" charset="0"/>
+              </a:rPr>
+              <a:t>WinSCP</a:t>
+            </a:r>
+            <a:endParaRPr lang="nl-BE" b="1" dirty="0" smtClean="0">
+              <a:latin typeface="Ubuntu" panose="020B0504030602030204" pitchFamily="34" charset="0"/>
+            </a:endParaRPr>
+          </a:p>
+          <a:p>
+            <a:r>
+              <a:rPr lang="nl-BE" dirty="0" smtClean="0">
+                <a:latin typeface="Ubuntu" panose="020B0504030602030204" pitchFamily="34" charset="0"/>
+              </a:rPr>
+              <a:t>Files over plaatsen</a:t>
+            </a:r>
+          </a:p>
+          <a:p>
+            <a:endParaRPr lang="nl-BE" dirty="0">
+              <a:latin typeface="Ubuntu" panose="020B0504030602030204" pitchFamily="34" charset="0"/>
+            </a:endParaRPr>
+          </a:p>
+          <a:p>
+            <a:r>
+              <a:rPr lang="nl-BE" b="1" dirty="0" err="1" smtClean="0">
+                <a:latin typeface="Ubuntu" panose="020B0504030602030204" pitchFamily="34" charset="0"/>
+              </a:rPr>
+              <a:t>Putty</a:t>
+            </a:r>
+            <a:r>
+              <a:rPr lang="nl-BE" b="1" dirty="0" smtClean="0">
+                <a:latin typeface="Ubuntu" panose="020B0504030602030204" pitchFamily="34" charset="0"/>
+              </a:rPr>
+              <a:t> </a:t>
+            </a:r>
+          </a:p>
+          <a:p>
+            <a:r>
+              <a:rPr lang="nl-BE" dirty="0" smtClean="0">
+                <a:latin typeface="Ubuntu" panose="020B0504030602030204" pitchFamily="34" charset="0"/>
+              </a:rPr>
+              <a:t>Pc op afstand besturen</a:t>
+            </a:r>
+            <a:endParaRPr lang="nl-BE" dirty="0">
+              <a:latin typeface="Ubuntu" panose="020B0504030602030204" pitchFamily="34" charset="0"/>
+            </a:endParaRPr>
+          </a:p>
+          <a:p>
+            <a:pPr marL="285750" indent="-285750">
+              <a:buFont typeface="Arial" panose="020B0604020202020204" pitchFamily="34" charset="0"/>
+              <a:buChar char="•"/>
+            </a:pPr>
+            <a:endParaRPr lang="nl-BE" dirty="0">
+              <a:latin typeface="Ubuntu" panose="020B0504030602030204" pitchFamily="34" charset="0"/>
+            </a:endParaRPr>
           </a:p>
         </p:txBody>
       </p:sp>
@@ -6433,6 +7202,13 @@
   <p:clrMapOvr>
     <a:masterClrMapping/>
   </p:clrMapOvr>
+  <p:timing>
+    <p:tnLst>
+      <p:par>
+        <p:cTn id="1" dur="indefinite" restart="never" nodeType="tmRoot"/>
+      </p:par>
+    </p:tnLst>
+  </p:timing>
 </p:sld>
 </file>
 
@@ -6500,6 +7276,187 @@
           </a:p>
         </p:txBody>
       </p:sp>
+      <p:sp>
+        <p:nvSpPr>
+          <p:cNvPr id="4" name="Tekstvak 3"/>
+          <p:cNvSpPr txBox="1"/>
+          <p:nvPr/>
+        </p:nvSpPr>
+        <p:spPr>
+          <a:xfrm>
+            <a:off x="551934" y="1524318"/>
+            <a:ext cx="5832389" cy="3693319"/>
+          </a:xfrm>
+          <a:prstGeom prst="rect">
+            <a:avLst/>
+          </a:prstGeom>
+          <a:noFill/>
+        </p:spPr>
+        <p:txBody>
+          <a:bodyPr wrap="square" rtlCol="0">
+            <a:spAutoFit/>
+          </a:bodyPr>
+          <a:lstStyle/>
+          <a:p>
+            <a:r>
+              <a:rPr lang="nl-BE" b="1" dirty="0" smtClean="0">
+                <a:latin typeface="Ubuntu" panose="020B0504030602030204" pitchFamily="34" charset="0"/>
+              </a:rPr>
+              <a:t>Problemen Web</a:t>
+            </a:r>
+          </a:p>
+          <a:p>
+            <a:r>
+              <a:rPr lang="nl-BE" i="1" dirty="0" smtClean="0">
+                <a:latin typeface="Ubuntu" panose="020B0504030602030204" pitchFamily="34" charset="0"/>
+              </a:rPr>
+              <a:t>PHP</a:t>
+            </a:r>
+          </a:p>
+          <a:p>
+            <a:pPr marL="285750" indent="-285750">
+              <a:buFont typeface="Arial" panose="020B0604020202020204" pitchFamily="34" charset="0"/>
+              <a:buChar char="•"/>
+            </a:pPr>
+            <a:r>
+              <a:rPr lang="nl-BE" dirty="0" smtClean="0">
+                <a:latin typeface="Ubuntu" panose="020B0504030602030204" pitchFamily="34" charset="0"/>
+              </a:rPr>
+              <a:t>1 X uitgevoerd bij laden pagina</a:t>
+            </a:r>
+          </a:p>
+          <a:p>
+            <a:pPr marL="285750" indent="-285750">
+              <a:buFont typeface="Arial" panose="020B0604020202020204" pitchFamily="34" charset="0"/>
+              <a:buChar char="•"/>
+            </a:pPr>
+            <a:r>
+              <a:rPr lang="nl-BE" dirty="0" smtClean="0">
+                <a:latin typeface="Ubuntu" panose="020B0504030602030204" pitchFamily="34" charset="0"/>
+              </a:rPr>
+              <a:t>Niet herhaalbaar in tijd</a:t>
+            </a:r>
+          </a:p>
+          <a:p>
+            <a:pPr marL="285750" indent="-285750">
+              <a:buFont typeface="Arial" panose="020B0604020202020204" pitchFamily="34" charset="0"/>
+              <a:buChar char="•"/>
+            </a:pPr>
+            <a:r>
+              <a:rPr lang="nl-BE" dirty="0" err="1" smtClean="0">
+                <a:latin typeface="Ubuntu" panose="020B0504030602030204" pitchFamily="34" charset="0"/>
+              </a:rPr>
+              <a:t>shell_exec</a:t>
+            </a:r>
+            <a:r>
+              <a:rPr lang="nl-BE" dirty="0" smtClean="0">
+                <a:latin typeface="Ubuntu" panose="020B0504030602030204" pitchFamily="34" charset="0"/>
+              </a:rPr>
+              <a:t> bevriest </a:t>
+            </a:r>
+            <a:r>
+              <a:rPr lang="nl-BE" dirty="0" err="1" smtClean="0">
+                <a:latin typeface="Ubuntu" panose="020B0504030602030204" pitchFamily="34" charset="0"/>
+              </a:rPr>
+              <a:t>app</a:t>
+            </a:r>
+            <a:r>
+              <a:rPr lang="nl-BE" dirty="0" smtClean="0">
+                <a:latin typeface="Ubuntu" panose="020B0504030602030204" pitchFamily="34" charset="0"/>
+              </a:rPr>
+              <a:t> bij uitvoeren</a:t>
+            </a:r>
+          </a:p>
+          <a:p>
+            <a:pPr marL="285750" indent="-285750">
+              <a:buFont typeface="Arial" panose="020B0604020202020204" pitchFamily="34" charset="0"/>
+              <a:buChar char="•"/>
+            </a:pPr>
+            <a:r>
+              <a:rPr lang="nl-BE" dirty="0" err="1" smtClean="0">
+                <a:latin typeface="Ubuntu" panose="020B0504030602030204" pitchFamily="34" charset="0"/>
+              </a:rPr>
+              <a:t>Multithreading</a:t>
+            </a:r>
+            <a:r>
+              <a:rPr lang="nl-BE" dirty="0" smtClean="0">
+                <a:latin typeface="Ubuntu" panose="020B0504030602030204" pitchFamily="34" charset="0"/>
+              </a:rPr>
+              <a:t>?</a:t>
+            </a:r>
+          </a:p>
+          <a:p>
+            <a:endParaRPr lang="nl-BE" dirty="0" smtClean="0">
+              <a:latin typeface="Ubuntu" panose="020B0504030602030204" pitchFamily="34" charset="0"/>
+            </a:endParaRPr>
+          </a:p>
+          <a:p>
+            <a:r>
+              <a:rPr lang="nl-BE" i="1" dirty="0" smtClean="0">
+                <a:latin typeface="Ubuntu" panose="020B0504030602030204" pitchFamily="34" charset="0"/>
+              </a:rPr>
+              <a:t>Javascript</a:t>
+            </a:r>
+          </a:p>
+          <a:p>
+            <a:pPr marL="285750" indent="-285750">
+              <a:buFont typeface="Arial" panose="020B0604020202020204" pitchFamily="34" charset="0"/>
+              <a:buChar char="•"/>
+            </a:pPr>
+            <a:r>
+              <a:rPr lang="nl-BE" dirty="0" smtClean="0">
+                <a:latin typeface="Ubuntu" panose="020B0504030602030204" pitchFamily="34" charset="0"/>
+              </a:rPr>
+              <a:t>Geen functie voor communicatie C</a:t>
+            </a:r>
+          </a:p>
+          <a:p>
+            <a:endParaRPr lang="nl-BE" dirty="0">
+              <a:latin typeface="Ubuntu" panose="020B0504030602030204" pitchFamily="34" charset="0"/>
+            </a:endParaRPr>
+          </a:p>
+          <a:p>
+            <a:r>
+              <a:rPr lang="nl-BE" i="1" dirty="0" err="1" smtClean="0">
+                <a:latin typeface="Ubuntu" panose="020B0504030602030204" pitchFamily="34" charset="0"/>
+              </a:rPr>
+              <a:t>JQuery</a:t>
+            </a:r>
+            <a:endParaRPr lang="nl-BE" i="1" dirty="0" smtClean="0">
+              <a:latin typeface="Ubuntu" panose="020B0504030602030204" pitchFamily="34" charset="0"/>
+            </a:endParaRPr>
+          </a:p>
+          <a:p>
+            <a:pPr marL="285750" indent="-285750">
+              <a:buFont typeface="Arial" panose="020B0604020202020204" pitchFamily="34" charset="0"/>
+              <a:buChar char="•"/>
+            </a:pPr>
+            <a:r>
+              <a:rPr lang="nl-BE" dirty="0" err="1">
+                <a:latin typeface="Ubuntu" panose="020B0504030602030204" pitchFamily="34" charset="0"/>
+              </a:rPr>
+              <a:t>shell_exec</a:t>
+            </a:r>
+            <a:r>
+              <a:rPr lang="nl-BE" dirty="0">
+                <a:latin typeface="Ubuntu" panose="020B0504030602030204" pitchFamily="34" charset="0"/>
+              </a:rPr>
+              <a:t> </a:t>
+            </a:r>
+            <a:r>
+              <a:rPr lang="nl-BE" dirty="0" smtClean="0">
+                <a:latin typeface="Ubuntu" panose="020B0504030602030204" pitchFamily="34" charset="0"/>
+              </a:rPr>
+              <a:t>werkt niet</a:t>
+            </a:r>
+          </a:p>
+          <a:p>
+            <a:endParaRPr lang="nl-BE" dirty="0">
+              <a:latin typeface="Ubuntu" panose="020B0504030602030204" pitchFamily="34" charset="0"/>
+            </a:endParaRPr>
+          </a:p>
+        </p:txBody>
+      </p:sp>
     </p:spTree>
     <p:extLst>
       <p:ext uri="{BB962C8B-B14F-4D97-AF65-F5344CB8AC3E}">
@@ -6510,6 +7467,13 @@
   <p:clrMapOvr>
     <a:masterClrMapping/>
   </p:clrMapOvr>
+  <p:timing>
+    <p:tnLst>
+      <p:par>
+        <p:cTn id="1" dur="indefinite" restart="never" nodeType="tmRoot"/>
+      </p:par>
+    </p:tnLst>
+  </p:timing>
 </p:sld>
 </file>
 
@@ -6547,7 +7511,7 @@
           <a:p>
             <a:r>
               <a:rPr lang="nl-BE" dirty="0" smtClean="0"/>
-              <a:t>Samenvatting</a:t>
+              <a:t>Software</a:t>
             </a:r>
             <a:endParaRPr lang="nl-BE" dirty="0"/>
           </a:p>
@@ -6577,16 +7541,163 @@
           </a:p>
         </p:txBody>
       </p:sp>
+      <p:sp>
+        <p:nvSpPr>
+          <p:cNvPr id="4" name="Tekstvak 3"/>
+          <p:cNvSpPr txBox="1"/>
+          <p:nvPr/>
+        </p:nvSpPr>
+        <p:spPr>
+          <a:xfrm>
+            <a:off x="568410" y="1524318"/>
+            <a:ext cx="4909751" cy="2862322"/>
+          </a:xfrm>
+          <a:prstGeom prst="rect">
+            <a:avLst/>
+          </a:prstGeom>
+          <a:noFill/>
+        </p:spPr>
+        <p:txBody>
+          <a:bodyPr wrap="square" rtlCol="0">
+            <a:spAutoFit/>
+          </a:bodyPr>
+          <a:lstStyle/>
+          <a:p>
+            <a:r>
+              <a:rPr lang="nl-BE" b="1" dirty="0" smtClean="0">
+                <a:latin typeface="Ubuntu" panose="020B0504030602030204" pitchFamily="34" charset="0"/>
+              </a:rPr>
+              <a:t>Problemen</a:t>
+            </a:r>
+            <a:endParaRPr lang="nl-BE" dirty="0" smtClean="0">
+              <a:latin typeface="Ubuntu" panose="020B0504030602030204" pitchFamily="34" charset="0"/>
+            </a:endParaRPr>
+          </a:p>
+          <a:p>
+            <a:r>
+              <a:rPr lang="nl-BE" i="1" dirty="0" smtClean="0">
+                <a:latin typeface="Ubuntu" panose="020B0504030602030204" pitchFamily="34" charset="0"/>
+              </a:rPr>
+              <a:t>C++</a:t>
+            </a:r>
+          </a:p>
+          <a:p>
+            <a:pPr marL="285750" indent="-285750">
+              <a:buFont typeface="Arial" panose="020B0604020202020204" pitchFamily="34" charset="0"/>
+              <a:buChar char="•"/>
+            </a:pPr>
+            <a:r>
+              <a:rPr lang="nl-BE" dirty="0" smtClean="0">
+                <a:latin typeface="Ubuntu" panose="020B0504030602030204" pitchFamily="34" charset="0"/>
+              </a:rPr>
+              <a:t>Syntax minder straight forward</a:t>
+            </a:r>
+          </a:p>
+          <a:p>
+            <a:endParaRPr lang="nl-BE" dirty="0">
+              <a:latin typeface="Ubuntu" panose="020B0504030602030204" pitchFamily="34" charset="0"/>
+            </a:endParaRPr>
+          </a:p>
+          <a:p>
+            <a:r>
+              <a:rPr lang="nl-BE" i="1" dirty="0" smtClean="0">
+                <a:latin typeface="Ubuntu" panose="020B0504030602030204" pitchFamily="34" charset="0"/>
+              </a:rPr>
+              <a:t>Python</a:t>
+            </a:r>
+          </a:p>
+          <a:p>
+            <a:pPr marL="285750" indent="-285750">
+              <a:buFont typeface="Arial" panose="020B0604020202020204" pitchFamily="34" charset="0"/>
+              <a:buChar char="•"/>
+            </a:pPr>
+            <a:r>
+              <a:rPr lang="nl-BE" dirty="0" smtClean="0">
+                <a:latin typeface="Ubuntu" panose="020B0504030602030204" pitchFamily="34" charset="0"/>
+              </a:rPr>
+              <a:t>C-</a:t>
+            </a:r>
+            <a:r>
+              <a:rPr lang="nl-BE" dirty="0" err="1" smtClean="0">
+                <a:latin typeface="Ubuntu" panose="020B0504030602030204" pitchFamily="34" charset="0"/>
+              </a:rPr>
+              <a:t>based</a:t>
+            </a:r>
+            <a:r>
+              <a:rPr lang="nl-BE" dirty="0" smtClean="0">
+                <a:latin typeface="Ubuntu" panose="020B0504030602030204" pitchFamily="34" charset="0"/>
+              </a:rPr>
+              <a:t> oplossing gevraagd</a:t>
+            </a:r>
+          </a:p>
+          <a:p>
+            <a:endParaRPr lang="nl-BE" dirty="0">
+              <a:latin typeface="Ubuntu" panose="020B0504030602030204" pitchFamily="34" charset="0"/>
+            </a:endParaRPr>
+          </a:p>
+          <a:p>
+            <a:r>
+              <a:rPr lang="nl-NL" i="1" dirty="0" err="1" smtClean="0">
+                <a:latin typeface="Ubuntu" panose="020B0504030602030204" pitchFamily="34" charset="0"/>
+              </a:rPr>
+              <a:t>Emscripten</a:t>
+            </a:r>
+            <a:endParaRPr lang="nl-BE" i="1" dirty="0" smtClean="0">
+              <a:latin typeface="Ubuntu" panose="020B0504030602030204" pitchFamily="34" charset="0"/>
+            </a:endParaRPr>
+          </a:p>
+          <a:p>
+            <a:pPr marL="285750" indent="-285750">
+              <a:buFont typeface="Arial" panose="020B0604020202020204" pitchFamily="34" charset="0"/>
+              <a:buChar char="•"/>
+            </a:pPr>
+            <a:r>
+              <a:rPr lang="nl-BE" dirty="0" smtClean="0">
+                <a:latin typeface="Ubuntu" panose="020B0504030602030204" pitchFamily="34" charset="0"/>
+              </a:rPr>
+              <a:t>C/C++ naar Javascript</a:t>
+            </a:r>
+          </a:p>
+          <a:p>
+            <a:pPr marL="285750" indent="-285750">
+              <a:buFont typeface="Arial" panose="020B0604020202020204" pitchFamily="34" charset="0"/>
+              <a:buChar char="•"/>
+            </a:pPr>
+            <a:r>
+              <a:rPr lang="nl-BE" dirty="0" err="1" smtClean="0">
+                <a:latin typeface="Ubuntu" panose="020B0504030602030204" pitchFamily="34" charset="0"/>
+              </a:rPr>
+              <a:t>WiringPi</a:t>
+            </a:r>
+            <a:r>
+              <a:rPr lang="nl-BE" dirty="0" smtClean="0">
+                <a:latin typeface="Ubuntu" panose="020B0504030602030204" pitchFamily="34" charset="0"/>
+              </a:rPr>
+              <a:t> niet ondersteund</a:t>
+            </a:r>
+            <a:endParaRPr lang="nl-BE" dirty="0">
+              <a:latin typeface="Ubuntu" panose="020B0504030602030204" pitchFamily="34" charset="0"/>
+            </a:endParaRPr>
+          </a:p>
+        </p:txBody>
+      </p:sp>
     </p:spTree>
     <p:extLst>
       <p:ext uri="{BB962C8B-B14F-4D97-AF65-F5344CB8AC3E}">
-        <p14:creationId xmlns:p14="http://schemas.microsoft.com/office/powerpoint/2010/main" val="2767405011"/>
+        <p14:creationId xmlns:p14="http://schemas.microsoft.com/office/powerpoint/2010/main" val="952714438"/>
       </p:ext>
     </p:extLst>
   </p:cSld>
   <p:clrMapOvr>
     <a:masterClrMapping/>
   </p:clrMapOvr>
+  <p:timing>
+    <p:tnLst>
+      <p:par>
+        <p:cTn id="1" dur="indefinite" restart="never" nodeType="tmRoot"/>
+      </p:par>
+    </p:tnLst>
+  </p:timing>
 </p:sld>
 </file>
 
@@ -6622,10 +7733,6 @@
           <a:bodyPr/>
           <a:lstStyle/>
           <a:p>
-            <a:r>
-              <a:rPr lang="nl-BE" dirty="0" smtClean="0"/>
-              <a:t>Demo</a:t>
-            </a:r>
             <a:endParaRPr lang="nl-BE" dirty="0"/>
           </a:p>
         </p:txBody>
@@ -6654,16 +7761,53 @@
           </a:p>
         </p:txBody>
       </p:sp>
+      <p:pic>
+        <p:nvPicPr>
+          <p:cNvPr id="4" name="Afbeelding 3"/>
+          <p:cNvPicPr>
+            <a:picLocks noChangeAspect="1"/>
+          </p:cNvPicPr>
+          <p:nvPr/>
+        </p:nvPicPr>
+        <p:blipFill>
+          <a:blip r:embed="rId2">
+            <a:extLst>
+              <a:ext uri="{28A0092B-C50C-407E-A947-70E740481C1C}">
+                <a14:useLocalDpi xmlns:a14="http://schemas.microsoft.com/office/drawing/2010/main" val="0"/>
+              </a:ext>
+            </a:extLst>
+          </a:blip>
+          <a:stretch>
+            <a:fillRect/>
+          </a:stretch>
+        </p:blipFill>
+        <p:spPr>
+          <a:xfrm>
+            <a:off x="457200" y="0"/>
+            <a:ext cx="8106032" cy="6537123"/>
+          </a:xfrm>
+          <a:prstGeom prst="rect">
+            <a:avLst/>
+          </a:prstGeom>
+        </p:spPr>
+      </p:pic>
     </p:spTree>
     <p:extLst>
       <p:ext uri="{BB962C8B-B14F-4D97-AF65-F5344CB8AC3E}">
-        <p14:creationId xmlns:p14="http://schemas.microsoft.com/office/powerpoint/2010/main" val="206950789"/>
+        <p14:creationId xmlns:p14="http://schemas.microsoft.com/office/powerpoint/2010/main" val="345705766"/>
       </p:ext>
     </p:extLst>
   </p:cSld>
   <p:clrMapOvr>
     <a:masterClrMapping/>
   </p:clrMapOvr>
+  <p:timing>
+    <p:tnLst>
+      <p:par>
+        <p:cTn id="1" dur="indefinite" restart="never" nodeType="tmRoot"/>
+      </p:par>
+    </p:tnLst>
+  </p:timing>
 </p:sld>
 </file>
 

</xml_diff>